<commit_message>
page not rendeinrg logo
</commit_message>
<xml_diff>
--- a/fig/logo.pptx
+++ b/fig/logo.pptx
@@ -111,6 +111,11 @@
       </a:defRPr>
     </a:lvl9pPr>
   </p:defaultTextStyle>
+  <p:extLst>
+    <p:ext uri="{EFAFB233-063F-42B5-8137-9DF3F51BA10A}">
+      <p15:sldGuideLst xmlns:p15="http://schemas.microsoft.com/office/powerpoint/2012/main"/>
+    </p:ext>
+  </p:extLst>
 </p:presentation>
 </file>
 
@@ -4480,7 +4485,7 @@
           </p:nvSpPr>
           <p:spPr>
             <a:xfrm>
-              <a:off x="6344285" y="694451"/>
+              <a:off x="6451610" y="758846"/>
               <a:ext cx="1412240" cy="2215991"/>
             </a:xfrm>
             <a:prstGeom prst="rect">
@@ -4526,7 +4531,7 @@
           </p:nvSpPr>
           <p:spPr>
             <a:xfrm>
-              <a:off x="5656054" y="694451"/>
+              <a:off x="5763379" y="758846"/>
               <a:ext cx="1412240" cy="2215991"/>
             </a:xfrm>
             <a:prstGeom prst="rect">
@@ -4572,7 +4577,7 @@
           </p:nvSpPr>
           <p:spPr>
             <a:xfrm>
-              <a:off x="4619304" y="694451"/>
+              <a:off x="4726629" y="758846"/>
               <a:ext cx="1412240" cy="2215991"/>
             </a:xfrm>
             <a:prstGeom prst="rect">
@@ -4618,7 +4623,7 @@
           </p:nvSpPr>
           <p:spPr>
             <a:xfrm>
-              <a:off x="4004201" y="694451"/>
+              <a:off x="4111526" y="758846"/>
               <a:ext cx="1412240" cy="2215991"/>
             </a:xfrm>
             <a:prstGeom prst="rect">
@@ -4664,7 +4669,7 @@
           </p:nvSpPr>
           <p:spPr>
             <a:xfrm>
-              <a:off x="3362960" y="694451"/>
+              <a:off x="3470285" y="758846"/>
               <a:ext cx="1412240" cy="2215991"/>
             </a:xfrm>
             <a:prstGeom prst="rect">

</xml_diff>